<commit_message>
Day 8 prep up matarials updated
</commit_message>
<xml_diff>
--- a/Day8/DockerAndKubernetes_Training-Day8.pptx
+++ b/Day8/DockerAndKubernetes_Training-Day8.pptx
@@ -6,14 +6,15 @@
     <p:sldMasterId id="2147483880" r:id="rId2"/>
   </p:sldMasterIdLst>
   <p:notesMasterIdLst>
-    <p:notesMasterId r:id="rId8"/>
+    <p:notesMasterId r:id="rId9"/>
   </p:notesMasterIdLst>
   <p:sldIdLst>
     <p:sldId id="434" r:id="rId3"/>
     <p:sldId id="435" r:id="rId4"/>
     <p:sldId id="400" r:id="rId5"/>
     <p:sldId id="401" r:id="rId6"/>
-    <p:sldId id="437" r:id="rId7"/>
+    <p:sldId id="438" r:id="rId7"/>
+    <p:sldId id="437" r:id="rId8"/>
   </p:sldIdLst>
   <p:sldSz cx="12192000" cy="6858000"/>
   <p:notesSz cx="6858000" cy="9144000"/>
@@ -202,7 +203,7 @@
           <a:p>
             <a:fld id="{B09F413D-6E72-4B8A-80ED-A580F7C91B71}" type="datetimeFigureOut">
               <a:rPr lang="en-IN" smtClean="0"/>
-              <a:t>12-04-2023</a:t>
+              <a:t>17-04-2023</a:t>
             </a:fld>
             <a:endParaRPr lang="en-IN"/>
           </a:p>
@@ -613,7 +614,7 @@
             <a:fld id="{49F3E739-D457-46E5-B626-C9B182A007EE}" type="datetimeFigureOut">
               <a:rPr lang="en-US" smtClean="0"/>
               <a:pPr/>
-              <a:t>4/12/2023</a:t>
+              <a:t>4/17/2023</a:t>
             </a:fld>
             <a:endParaRPr lang="en-US"/>
           </a:p>
@@ -795,7 +796,7 @@
             <a:fld id="{49F3E739-D457-46E5-B626-C9B182A007EE}" type="datetimeFigureOut">
               <a:rPr lang="en-US" smtClean="0"/>
               <a:pPr/>
-              <a:t>4/12/2023</a:t>
+              <a:t>4/17/2023</a:t>
             </a:fld>
             <a:endParaRPr lang="en-US"/>
           </a:p>
@@ -975,7 +976,7 @@
             <a:fld id="{49F3E739-D457-46E5-B626-C9B182A007EE}" type="datetimeFigureOut">
               <a:rPr lang="en-US" smtClean="0"/>
               <a:pPr/>
-              <a:t>4/12/2023</a:t>
+              <a:t>4/17/2023</a:t>
             </a:fld>
             <a:endParaRPr lang="en-US"/>
           </a:p>
@@ -1372,7 +1373,7 @@
           <a:p>
             <a:fld id="{12E8600E-B0EE-4521-BF40-4B72FBA06775}" type="datetimeFigureOut">
               <a:rPr lang="en-IN" smtClean="0"/>
-              <a:t>12-04-2023</a:t>
+              <a:t>17-04-2023</a:t>
             </a:fld>
             <a:endParaRPr lang="en-IN"/>
           </a:p>
@@ -1603,7 +1604,7 @@
           <a:p>
             <a:fld id="{12E8600E-B0EE-4521-BF40-4B72FBA06775}" type="datetimeFigureOut">
               <a:rPr lang="en-IN" smtClean="0"/>
-              <a:t>12-04-2023</a:t>
+              <a:t>17-04-2023</a:t>
             </a:fld>
             <a:endParaRPr lang="en-IN"/>
           </a:p>
@@ -2637,7 +2638,7 @@
           <a:p>
             <a:fld id="{12E8600E-B0EE-4521-BF40-4B72FBA06775}" type="datetimeFigureOut">
               <a:rPr lang="en-IN" smtClean="0"/>
-              <a:t>12-04-2023</a:t>
+              <a:t>17-04-2023</a:t>
             </a:fld>
             <a:endParaRPr lang="en-IN"/>
           </a:p>
@@ -2909,7 +2910,7 @@
           <a:p>
             <a:fld id="{12E8600E-B0EE-4521-BF40-4B72FBA06775}" type="datetimeFigureOut">
               <a:rPr lang="en-IN" smtClean="0"/>
-              <a:t>12-04-2023</a:t>
+              <a:t>17-04-2023</a:t>
             </a:fld>
             <a:endParaRPr lang="en-IN"/>
           </a:p>
@@ -3320,7 +3321,7 @@
             <a:fld id="{49F3E739-D457-46E5-B626-C9B182A007EE}" type="datetimeFigureOut">
               <a:rPr lang="en-US" smtClean="0"/>
               <a:pPr/>
-              <a:t>4/12/2023</a:t>
+              <a:t>4/17/2023</a:t>
             </a:fld>
             <a:endParaRPr lang="en-US"/>
           </a:p>
@@ -3448,7 +3449,7 @@
           <a:p>
             <a:fld id="{12E8600E-B0EE-4521-BF40-4B72FBA06775}" type="datetimeFigureOut">
               <a:rPr lang="en-IN" smtClean="0"/>
-              <a:t>12-04-2023</a:t>
+              <a:t>17-04-2023</a:t>
             </a:fld>
             <a:endParaRPr lang="en-IN"/>
           </a:p>
@@ -3543,7 +3544,7 @@
           <a:p>
             <a:fld id="{12E8600E-B0EE-4521-BF40-4B72FBA06775}" type="datetimeFigureOut">
               <a:rPr lang="en-IN" smtClean="0"/>
-              <a:t>12-04-2023</a:t>
+              <a:t>17-04-2023</a:t>
             </a:fld>
             <a:endParaRPr lang="en-IN"/>
           </a:p>
@@ -4624,7 +4625,7 @@
           <a:p>
             <a:fld id="{12E8600E-B0EE-4521-BF40-4B72FBA06775}" type="datetimeFigureOut">
               <a:rPr lang="en-IN" smtClean="0"/>
-              <a:t>12-04-2023</a:t>
+              <a:t>17-04-2023</a:t>
             </a:fld>
             <a:endParaRPr lang="en-IN"/>
           </a:p>
@@ -4878,7 +4879,7 @@
             <a:fld id="{49F3E739-D457-46E5-B626-C9B182A007EE}" type="datetimeFigureOut">
               <a:rPr lang="en-US" smtClean="0"/>
               <a:pPr/>
-              <a:t>4/12/2023</a:t>
+              <a:t>4/17/2023</a:t>
             </a:fld>
             <a:endParaRPr lang="en-US"/>
           </a:p>
@@ -5952,7 +5953,7 @@
             <a:fld id="{49F3E739-D457-46E5-B626-C9B182A007EE}" type="datetimeFigureOut">
               <a:rPr lang="en-US" smtClean="0"/>
               <a:pPr/>
-              <a:t>4/12/2023</a:t>
+              <a:t>4/17/2023</a:t>
             </a:fld>
             <a:endParaRPr lang="en-US"/>
           </a:p>
@@ -7022,7 +7023,7 @@
             <a:fld id="{49F3E739-D457-46E5-B626-C9B182A007EE}" type="datetimeFigureOut">
               <a:rPr lang="en-US" smtClean="0"/>
               <a:pPr/>
-              <a:t>4/12/2023</a:t>
+              <a:t>4/17/2023</a:t>
             </a:fld>
             <a:endParaRPr lang="en-US"/>
           </a:p>
@@ -8004,7 +8005,7 @@
             <a:fld id="{49F3E739-D457-46E5-B626-C9B182A007EE}" type="datetimeFigureOut">
               <a:rPr lang="en-US" smtClean="0"/>
               <a:pPr/>
-              <a:t>4/12/2023</a:t>
+              <a:t>4/17/2023</a:t>
             </a:fld>
             <a:endParaRPr lang="en-US"/>
           </a:p>
@@ -9140,7 +9141,7 @@
             <a:fld id="{49F3E739-D457-46E5-B626-C9B182A007EE}" type="datetimeFigureOut">
               <a:rPr lang="en-US" smtClean="0"/>
               <a:pPr/>
-              <a:t>4/12/2023</a:t>
+              <a:t>4/17/2023</a:t>
             </a:fld>
             <a:endParaRPr lang="en-US"/>
           </a:p>
@@ -10175,7 +10176,7 @@
             <a:fld id="{49F3E739-D457-46E5-B626-C9B182A007EE}" type="datetimeFigureOut">
               <a:rPr lang="en-US" smtClean="0"/>
               <a:pPr/>
-              <a:t>4/12/2023</a:t>
+              <a:t>4/17/2023</a:t>
             </a:fld>
             <a:endParaRPr lang="en-US"/>
           </a:p>
@@ -10837,7 +10838,7 @@
             <a:fld id="{49F3E739-D457-46E5-B626-C9B182A007EE}" type="datetimeFigureOut">
               <a:rPr lang="en-US" smtClean="0"/>
               <a:pPr/>
-              <a:t>4/12/2023</a:t>
+              <a:t>4/17/2023</a:t>
             </a:fld>
             <a:endParaRPr lang="en-US"/>
           </a:p>
@@ -11700,7 +11701,7 @@
             <a:fld id="{49F3E739-D457-46E5-B626-C9B182A007EE}" type="datetimeFigureOut">
               <a:rPr lang="en-US" smtClean="0"/>
               <a:pPr/>
-              <a:t>4/12/2023</a:t>
+              <a:t>4/17/2023</a:t>
             </a:fld>
             <a:endParaRPr lang="en-US"/>
           </a:p>
@@ -11891,7 +11892,7 @@
           <a:p>
             <a:fld id="{12E8600E-B0EE-4521-BF40-4B72FBA06775}" type="datetimeFigureOut">
               <a:rPr lang="en-IN" smtClean="0"/>
-              <a:t>12-04-2023</a:t>
+              <a:t>17-04-2023</a:t>
             </a:fld>
             <a:endParaRPr lang="en-IN"/>
           </a:p>
@@ -12863,7 +12864,7 @@
           <a:p>
             <a:fld id="{12E8600E-B0EE-4521-BF40-4B72FBA06775}" type="datetimeFigureOut">
               <a:rPr lang="en-IN" smtClean="0"/>
-              <a:t>12-04-2023</a:t>
+              <a:t>17-04-2023</a:t>
             </a:fld>
             <a:endParaRPr lang="en-IN"/>
           </a:p>
@@ -13145,7 +13146,7 @@
             <a:fld id="{49F3E739-D457-46E5-B626-C9B182A007EE}" type="datetimeFigureOut">
               <a:rPr lang="en-US" smtClean="0"/>
               <a:pPr/>
-              <a:t>4/12/2023</a:t>
+              <a:t>4/17/2023</a:t>
             </a:fld>
             <a:endParaRPr lang="en-US"/>
           </a:p>
@@ -13376,7 +13377,7 @@
             <a:fld id="{49F3E739-D457-46E5-B626-C9B182A007EE}" type="datetimeFigureOut">
               <a:rPr lang="en-US" smtClean="0"/>
               <a:pPr/>
-              <a:t>4/12/2023</a:t>
+              <a:t>4/17/2023</a:t>
             </a:fld>
             <a:endParaRPr lang="en-US"/>
           </a:p>
@@ -13742,7 +13743,7 @@
             <a:fld id="{49F3E739-D457-46E5-B626-C9B182A007EE}" type="datetimeFigureOut">
               <a:rPr lang="en-US" smtClean="0"/>
               <a:pPr/>
-              <a:t>4/12/2023</a:t>
+              <a:t>4/17/2023</a:t>
             </a:fld>
             <a:endParaRPr lang="en-US"/>
           </a:p>
@@ -13861,7 +13862,7 @@
             <a:fld id="{49F3E739-D457-46E5-B626-C9B182A007EE}" type="datetimeFigureOut">
               <a:rPr lang="en-US" smtClean="0"/>
               <a:pPr/>
-              <a:t>4/12/2023</a:t>
+              <a:t>4/17/2023</a:t>
             </a:fld>
             <a:endParaRPr lang="en-US"/>
           </a:p>
@@ -13958,7 +13959,7 @@
             <a:fld id="{49F3E739-D457-46E5-B626-C9B182A007EE}" type="datetimeFigureOut">
               <a:rPr lang="en-US" smtClean="0"/>
               <a:pPr/>
-              <a:t>4/12/2023</a:t>
+              <a:t>4/17/2023</a:t>
             </a:fld>
             <a:endParaRPr lang="en-US"/>
           </a:p>
@@ -14235,7 +14236,7 @@
             <a:fld id="{49F3E739-D457-46E5-B626-C9B182A007EE}" type="datetimeFigureOut">
               <a:rPr lang="en-US" smtClean="0"/>
               <a:pPr/>
-              <a:t>4/12/2023</a:t>
+              <a:t>4/17/2023</a:t>
             </a:fld>
             <a:endParaRPr lang="en-US"/>
           </a:p>
@@ -14489,7 +14490,7 @@
             <a:fld id="{49F3E739-D457-46E5-B626-C9B182A007EE}" type="datetimeFigureOut">
               <a:rPr lang="en-US" smtClean="0"/>
               <a:pPr/>
-              <a:t>4/12/2023</a:t>
+              <a:t>4/17/2023</a:t>
             </a:fld>
             <a:endParaRPr lang="en-US"/>
           </a:p>
@@ -14703,7 +14704,7 @@
             <a:fld id="{49F3E739-D457-46E5-B626-C9B182A007EE}" type="datetimeFigureOut">
               <a:rPr lang="en-US" smtClean="0"/>
               <a:pPr/>
-              <a:t>4/12/2023</a:t>
+              <a:t>4/17/2023</a:t>
             </a:fld>
             <a:endParaRPr lang="en-US"/>
           </a:p>
@@ -16066,7 +16067,7 @@
             <a:fld id="{49F3E739-D457-46E5-B626-C9B182A007EE}" type="datetimeFigureOut">
               <a:rPr lang="en-US" smtClean="0"/>
               <a:pPr/>
-              <a:t>4/12/2023</a:t>
+              <a:t>4/17/2023</a:t>
             </a:fld>
             <a:endParaRPr lang="en-US"/>
           </a:p>
@@ -17037,8 +17038,19 @@
           <a:p>
             <a:r>
               <a:rPr lang="en-US" dirty="0"/>
-              <a:t>Dockerfile Writeup/example/explanation</a:t>
+              <a:t>Dockerfile Writeup/example/explanation – Nodejs/Java</a:t>
             </a:r>
+          </a:p>
+          <a:p>
+            <a:r>
+              <a:rPr lang="en-US" dirty="0"/>
+              <a:t>CMD vs </a:t>
+            </a:r>
+            <a:r>
+              <a:rPr lang="en-US" dirty="0" err="1"/>
+              <a:t>EntryPoint</a:t>
+            </a:r>
+            <a:endParaRPr lang="en-US" dirty="0"/>
           </a:p>
           <a:p>
             <a:r>
@@ -17049,13 +17061,13 @@
           <a:p>
             <a:r>
               <a:rPr lang="en-US" dirty="0"/>
-              <a:t>Dockerfile - Multi Stage Build</a:t>
+              <a:t>Docker volume</a:t>
             </a:r>
           </a:p>
           <a:p>
             <a:r>
               <a:rPr lang="en-US" dirty="0"/>
-              <a:t>Docker volume</a:t>
+              <a:t>Docker Port Expose/Publish</a:t>
             </a:r>
           </a:p>
           <a:p>
@@ -26897,6 +26909,108 @@
           <p:cNvPr id="2" name="Title 1">
             <a:extLst>
               <a:ext uri="{FF2B5EF4-FFF2-40B4-BE49-F238E27FC236}">
+                <a16:creationId xmlns:a16="http://schemas.microsoft.com/office/drawing/2014/main" id="{E56F869C-A1E7-4989-E938-BA5DE46D1FD1}"/>
+              </a:ext>
+            </a:extLst>
+          </p:cNvPr>
+          <p:cNvSpPr>
+            <a:spLocks noGrp="1"/>
+          </p:cNvSpPr>
+          <p:nvPr>
+            <p:ph type="title"/>
+          </p:nvPr>
+        </p:nvSpPr>
+        <p:spPr>
+          <a:xfrm>
+            <a:off x="717453" y="973668"/>
+            <a:ext cx="9198914" cy="706964"/>
+          </a:xfrm>
+        </p:spPr>
+        <p:txBody>
+          <a:bodyPr>
+            <a:normAutofit/>
+          </a:bodyPr>
+          <a:lstStyle/>
+          <a:p>
+            <a:r>
+              <a:rPr lang="en-US" dirty="0"/>
+              <a:t>DOCKERFILE – PYTHON EXAMPLE</a:t>
+            </a:r>
+            <a:endParaRPr lang="en-IN" dirty="0"/>
+          </a:p>
+        </p:txBody>
+      </p:sp>
+      <p:pic>
+        <p:nvPicPr>
+          <p:cNvPr id="5" name="Picture 4">
+            <a:extLst>
+              <a:ext uri="{FF2B5EF4-FFF2-40B4-BE49-F238E27FC236}">
+                <a16:creationId xmlns:a16="http://schemas.microsoft.com/office/drawing/2014/main" id="{697933E2-13DF-74CD-1E8D-8A7FA7598462}"/>
+              </a:ext>
+            </a:extLst>
+          </p:cNvPr>
+          <p:cNvPicPr>
+            <a:picLocks noChangeAspect="1"/>
+          </p:cNvPicPr>
+          <p:nvPr/>
+        </p:nvPicPr>
+        <p:blipFill>
+          <a:blip r:embed="rId2">
+            <a:extLst>
+              <a:ext uri="{28A0092B-C50C-407E-A947-70E740481C1C}">
+                <a14:useLocalDpi xmlns:a14="http://schemas.microsoft.com/office/drawing/2010/main" val="0"/>
+              </a:ext>
+            </a:extLst>
+          </a:blip>
+          <a:stretch>
+            <a:fillRect/>
+          </a:stretch>
+        </p:blipFill>
+        <p:spPr>
+          <a:xfrm>
+            <a:off x="844062" y="2198252"/>
+            <a:ext cx="10621107" cy="4659748"/>
+          </a:xfrm>
+          <a:prstGeom prst="rect">
+            <a:avLst/>
+          </a:prstGeom>
+        </p:spPr>
+      </p:pic>
+    </p:spTree>
+    <p:extLst>
+      <p:ext uri="{BB962C8B-B14F-4D97-AF65-F5344CB8AC3E}">
+        <p14:creationId xmlns:p14="http://schemas.microsoft.com/office/powerpoint/2010/main" val="3380619242"/>
+      </p:ext>
+    </p:extLst>
+  </p:cSld>
+  <p:clrMapOvr>
+    <a:masterClrMapping/>
+  </p:clrMapOvr>
+</p:sld>
+</file>
+
+<file path=ppt/slides/slide6.xml><?xml version="1.0" encoding="utf-8"?>
+<p:sld xmlns:a="http://schemas.openxmlformats.org/drawingml/2006/main" xmlns:r="http://schemas.openxmlformats.org/officeDocument/2006/relationships" xmlns:p="http://schemas.openxmlformats.org/presentationml/2006/main">
+  <p:cSld>
+    <p:spTree>
+      <p:nvGrpSpPr>
+        <p:cNvPr id="1" name=""/>
+        <p:cNvGrpSpPr/>
+        <p:nvPr/>
+      </p:nvGrpSpPr>
+      <p:grpSpPr>
+        <a:xfrm>
+          <a:off x="0" y="0"/>
+          <a:ext cx="0" cy="0"/>
+          <a:chOff x="0" y="0"/>
+          <a:chExt cx="0" cy="0"/>
+        </a:xfrm>
+      </p:grpSpPr>
+      <p:sp>
+        <p:nvSpPr>
+          <p:cNvPr id="2" name="Title 1">
+            <a:extLst>
+              <a:ext uri="{FF2B5EF4-FFF2-40B4-BE49-F238E27FC236}">
                 <a16:creationId xmlns:a16="http://schemas.microsoft.com/office/drawing/2014/main" id="{13182FD3-6C7D-6C4E-252E-520951EBDC12}"/>
               </a:ext>
             </a:extLst>
@@ -26961,6 +27075,51 @@
             </a:r>
           </a:p>
           <a:p>
+            <a:r>
+              <a:rPr lang="en-IN" dirty="0"/>
+              <a:t>Docker Volumes - </a:t>
+            </a:r>
+            <a:r>
+              <a:rPr lang="en-IN" dirty="0">
+                <a:hlinkClick r:id="rId2"/>
+              </a:rPr>
+              <a:t>https://docs.docker.com/storage/volumes/</a:t>
+            </a:r>
+            <a:endParaRPr lang="en-IN" dirty="0"/>
+          </a:p>
+          <a:p>
+            <a:r>
+              <a:rPr lang="en-IN" dirty="0" err="1"/>
+              <a:t>DockerFile</a:t>
+            </a:r>
+            <a:r>
+              <a:rPr lang="en-IN" dirty="0"/>
+              <a:t> NodeJS Practice – https://docs.docker.com/language/nodejs/</a:t>
+            </a:r>
+          </a:p>
+          <a:p>
+            <a:r>
+              <a:rPr lang="en-IN" dirty="0" err="1"/>
+              <a:t>DockerFile</a:t>
+            </a:r>
+            <a:r>
+              <a:rPr lang="en-IN" dirty="0"/>
+              <a:t> Java Practice - https://docs.docker.com/language/java/</a:t>
+            </a:r>
+          </a:p>
+          <a:p>
+            <a:r>
+              <a:rPr lang="en-IN" dirty="0" err="1"/>
+              <a:t>DockerFile</a:t>
+            </a:r>
+            <a:r>
+              <a:rPr lang="en-IN" dirty="0"/>
+              <a:t> </a:t>
+            </a:r>
+            <a:r>
+              <a:rPr lang="en-IN"/>
+              <a:t>Python Reference</a:t>
+            </a:r>
             <a:endParaRPr lang="en-IN" dirty="0"/>
           </a:p>
           <a:p>

</xml_diff>

<commit_message>
Day 9 and 10 PPT updated
</commit_message>
<xml_diff>
--- a/Day8/DockerAndKubernetes_Training-Day8.pptx
+++ b/Day8/DockerAndKubernetes_Training-Day8.pptx
@@ -203,7 +203,7 @@
           <a:p>
             <a:fld id="{B09F413D-6E72-4B8A-80ED-A580F7C91B71}" type="datetimeFigureOut">
               <a:rPr lang="en-IN" smtClean="0"/>
-              <a:t>17-04-2023</a:t>
+              <a:t>18-04-2023</a:t>
             </a:fld>
             <a:endParaRPr lang="en-IN"/>
           </a:p>
@@ -614,7 +614,7 @@
             <a:fld id="{49F3E739-D457-46E5-B626-C9B182A007EE}" type="datetimeFigureOut">
               <a:rPr lang="en-US" smtClean="0"/>
               <a:pPr/>
-              <a:t>4/17/2023</a:t>
+              <a:t>4/18/2023</a:t>
             </a:fld>
             <a:endParaRPr lang="en-US"/>
           </a:p>
@@ -796,7 +796,7 @@
             <a:fld id="{49F3E739-D457-46E5-B626-C9B182A007EE}" type="datetimeFigureOut">
               <a:rPr lang="en-US" smtClean="0"/>
               <a:pPr/>
-              <a:t>4/17/2023</a:t>
+              <a:t>4/18/2023</a:t>
             </a:fld>
             <a:endParaRPr lang="en-US"/>
           </a:p>
@@ -976,7 +976,7 @@
             <a:fld id="{49F3E739-D457-46E5-B626-C9B182A007EE}" type="datetimeFigureOut">
               <a:rPr lang="en-US" smtClean="0"/>
               <a:pPr/>
-              <a:t>4/17/2023</a:t>
+              <a:t>4/18/2023</a:t>
             </a:fld>
             <a:endParaRPr lang="en-US"/>
           </a:p>
@@ -1373,7 +1373,7 @@
           <a:p>
             <a:fld id="{12E8600E-B0EE-4521-BF40-4B72FBA06775}" type="datetimeFigureOut">
               <a:rPr lang="en-IN" smtClean="0"/>
-              <a:t>17-04-2023</a:t>
+              <a:t>18-04-2023</a:t>
             </a:fld>
             <a:endParaRPr lang="en-IN"/>
           </a:p>
@@ -1604,7 +1604,7 @@
           <a:p>
             <a:fld id="{12E8600E-B0EE-4521-BF40-4B72FBA06775}" type="datetimeFigureOut">
               <a:rPr lang="en-IN" smtClean="0"/>
-              <a:t>17-04-2023</a:t>
+              <a:t>18-04-2023</a:t>
             </a:fld>
             <a:endParaRPr lang="en-IN"/>
           </a:p>
@@ -2638,7 +2638,7 @@
           <a:p>
             <a:fld id="{12E8600E-B0EE-4521-BF40-4B72FBA06775}" type="datetimeFigureOut">
               <a:rPr lang="en-IN" smtClean="0"/>
-              <a:t>17-04-2023</a:t>
+              <a:t>18-04-2023</a:t>
             </a:fld>
             <a:endParaRPr lang="en-IN"/>
           </a:p>
@@ -2910,7 +2910,7 @@
           <a:p>
             <a:fld id="{12E8600E-B0EE-4521-BF40-4B72FBA06775}" type="datetimeFigureOut">
               <a:rPr lang="en-IN" smtClean="0"/>
-              <a:t>17-04-2023</a:t>
+              <a:t>18-04-2023</a:t>
             </a:fld>
             <a:endParaRPr lang="en-IN"/>
           </a:p>
@@ -3321,7 +3321,7 @@
             <a:fld id="{49F3E739-D457-46E5-B626-C9B182A007EE}" type="datetimeFigureOut">
               <a:rPr lang="en-US" smtClean="0"/>
               <a:pPr/>
-              <a:t>4/17/2023</a:t>
+              <a:t>4/18/2023</a:t>
             </a:fld>
             <a:endParaRPr lang="en-US"/>
           </a:p>
@@ -3449,7 +3449,7 @@
           <a:p>
             <a:fld id="{12E8600E-B0EE-4521-BF40-4B72FBA06775}" type="datetimeFigureOut">
               <a:rPr lang="en-IN" smtClean="0"/>
-              <a:t>17-04-2023</a:t>
+              <a:t>18-04-2023</a:t>
             </a:fld>
             <a:endParaRPr lang="en-IN"/>
           </a:p>
@@ -3544,7 +3544,7 @@
           <a:p>
             <a:fld id="{12E8600E-B0EE-4521-BF40-4B72FBA06775}" type="datetimeFigureOut">
               <a:rPr lang="en-IN" smtClean="0"/>
-              <a:t>17-04-2023</a:t>
+              <a:t>18-04-2023</a:t>
             </a:fld>
             <a:endParaRPr lang="en-IN"/>
           </a:p>
@@ -4625,7 +4625,7 @@
           <a:p>
             <a:fld id="{12E8600E-B0EE-4521-BF40-4B72FBA06775}" type="datetimeFigureOut">
               <a:rPr lang="en-IN" smtClean="0"/>
-              <a:t>17-04-2023</a:t>
+              <a:t>18-04-2023</a:t>
             </a:fld>
             <a:endParaRPr lang="en-IN"/>
           </a:p>
@@ -4879,7 +4879,7 @@
             <a:fld id="{49F3E739-D457-46E5-B626-C9B182A007EE}" type="datetimeFigureOut">
               <a:rPr lang="en-US" smtClean="0"/>
               <a:pPr/>
-              <a:t>4/17/2023</a:t>
+              <a:t>4/18/2023</a:t>
             </a:fld>
             <a:endParaRPr lang="en-US"/>
           </a:p>
@@ -5953,7 +5953,7 @@
             <a:fld id="{49F3E739-D457-46E5-B626-C9B182A007EE}" type="datetimeFigureOut">
               <a:rPr lang="en-US" smtClean="0"/>
               <a:pPr/>
-              <a:t>4/17/2023</a:t>
+              <a:t>4/18/2023</a:t>
             </a:fld>
             <a:endParaRPr lang="en-US"/>
           </a:p>
@@ -7023,7 +7023,7 @@
             <a:fld id="{49F3E739-D457-46E5-B626-C9B182A007EE}" type="datetimeFigureOut">
               <a:rPr lang="en-US" smtClean="0"/>
               <a:pPr/>
-              <a:t>4/17/2023</a:t>
+              <a:t>4/18/2023</a:t>
             </a:fld>
             <a:endParaRPr lang="en-US"/>
           </a:p>
@@ -8005,7 +8005,7 @@
             <a:fld id="{49F3E739-D457-46E5-B626-C9B182A007EE}" type="datetimeFigureOut">
               <a:rPr lang="en-US" smtClean="0"/>
               <a:pPr/>
-              <a:t>4/17/2023</a:t>
+              <a:t>4/18/2023</a:t>
             </a:fld>
             <a:endParaRPr lang="en-US"/>
           </a:p>
@@ -9141,7 +9141,7 @@
             <a:fld id="{49F3E739-D457-46E5-B626-C9B182A007EE}" type="datetimeFigureOut">
               <a:rPr lang="en-US" smtClean="0"/>
               <a:pPr/>
-              <a:t>4/17/2023</a:t>
+              <a:t>4/18/2023</a:t>
             </a:fld>
             <a:endParaRPr lang="en-US"/>
           </a:p>
@@ -10176,7 +10176,7 @@
             <a:fld id="{49F3E739-D457-46E5-B626-C9B182A007EE}" type="datetimeFigureOut">
               <a:rPr lang="en-US" smtClean="0"/>
               <a:pPr/>
-              <a:t>4/17/2023</a:t>
+              <a:t>4/18/2023</a:t>
             </a:fld>
             <a:endParaRPr lang="en-US"/>
           </a:p>
@@ -10838,7 +10838,7 @@
             <a:fld id="{49F3E739-D457-46E5-B626-C9B182A007EE}" type="datetimeFigureOut">
               <a:rPr lang="en-US" smtClean="0"/>
               <a:pPr/>
-              <a:t>4/17/2023</a:t>
+              <a:t>4/18/2023</a:t>
             </a:fld>
             <a:endParaRPr lang="en-US"/>
           </a:p>
@@ -11701,7 +11701,7 @@
             <a:fld id="{49F3E739-D457-46E5-B626-C9B182A007EE}" type="datetimeFigureOut">
               <a:rPr lang="en-US" smtClean="0"/>
               <a:pPr/>
-              <a:t>4/17/2023</a:t>
+              <a:t>4/18/2023</a:t>
             </a:fld>
             <a:endParaRPr lang="en-US"/>
           </a:p>
@@ -11892,7 +11892,7 @@
           <a:p>
             <a:fld id="{12E8600E-B0EE-4521-BF40-4B72FBA06775}" type="datetimeFigureOut">
               <a:rPr lang="en-IN" smtClean="0"/>
-              <a:t>17-04-2023</a:t>
+              <a:t>18-04-2023</a:t>
             </a:fld>
             <a:endParaRPr lang="en-IN"/>
           </a:p>
@@ -12864,7 +12864,7 @@
           <a:p>
             <a:fld id="{12E8600E-B0EE-4521-BF40-4B72FBA06775}" type="datetimeFigureOut">
               <a:rPr lang="en-IN" smtClean="0"/>
-              <a:t>17-04-2023</a:t>
+              <a:t>18-04-2023</a:t>
             </a:fld>
             <a:endParaRPr lang="en-IN"/>
           </a:p>
@@ -13146,7 +13146,7 @@
             <a:fld id="{49F3E739-D457-46E5-B626-C9B182A007EE}" type="datetimeFigureOut">
               <a:rPr lang="en-US" smtClean="0"/>
               <a:pPr/>
-              <a:t>4/17/2023</a:t>
+              <a:t>4/18/2023</a:t>
             </a:fld>
             <a:endParaRPr lang="en-US"/>
           </a:p>
@@ -13377,7 +13377,7 @@
             <a:fld id="{49F3E739-D457-46E5-B626-C9B182A007EE}" type="datetimeFigureOut">
               <a:rPr lang="en-US" smtClean="0"/>
               <a:pPr/>
-              <a:t>4/17/2023</a:t>
+              <a:t>4/18/2023</a:t>
             </a:fld>
             <a:endParaRPr lang="en-US"/>
           </a:p>
@@ -13743,7 +13743,7 @@
             <a:fld id="{49F3E739-D457-46E5-B626-C9B182A007EE}" type="datetimeFigureOut">
               <a:rPr lang="en-US" smtClean="0"/>
               <a:pPr/>
-              <a:t>4/17/2023</a:t>
+              <a:t>4/18/2023</a:t>
             </a:fld>
             <a:endParaRPr lang="en-US"/>
           </a:p>
@@ -13862,7 +13862,7 @@
             <a:fld id="{49F3E739-D457-46E5-B626-C9B182A007EE}" type="datetimeFigureOut">
               <a:rPr lang="en-US" smtClean="0"/>
               <a:pPr/>
-              <a:t>4/17/2023</a:t>
+              <a:t>4/18/2023</a:t>
             </a:fld>
             <a:endParaRPr lang="en-US"/>
           </a:p>
@@ -13959,7 +13959,7 @@
             <a:fld id="{49F3E739-D457-46E5-B626-C9B182A007EE}" type="datetimeFigureOut">
               <a:rPr lang="en-US" smtClean="0"/>
               <a:pPr/>
-              <a:t>4/17/2023</a:t>
+              <a:t>4/18/2023</a:t>
             </a:fld>
             <a:endParaRPr lang="en-US"/>
           </a:p>
@@ -14236,7 +14236,7 @@
             <a:fld id="{49F3E739-D457-46E5-B626-C9B182A007EE}" type="datetimeFigureOut">
               <a:rPr lang="en-US" smtClean="0"/>
               <a:pPr/>
-              <a:t>4/17/2023</a:t>
+              <a:t>4/18/2023</a:t>
             </a:fld>
             <a:endParaRPr lang="en-US"/>
           </a:p>
@@ -14490,7 +14490,7 @@
             <a:fld id="{49F3E739-D457-46E5-B626-C9B182A007EE}" type="datetimeFigureOut">
               <a:rPr lang="en-US" smtClean="0"/>
               <a:pPr/>
-              <a:t>4/17/2023</a:t>
+              <a:t>4/18/2023</a:t>
             </a:fld>
             <a:endParaRPr lang="en-US"/>
           </a:p>
@@ -14704,7 +14704,7 @@
             <a:fld id="{49F3E739-D457-46E5-B626-C9B182A007EE}" type="datetimeFigureOut">
               <a:rPr lang="en-US" smtClean="0"/>
               <a:pPr/>
-              <a:t>4/17/2023</a:t>
+              <a:t>4/18/2023</a:t>
             </a:fld>
             <a:endParaRPr lang="en-US"/>
           </a:p>
@@ -16067,7 +16067,7 @@
             <a:fld id="{49F3E739-D457-46E5-B626-C9B182A007EE}" type="datetimeFigureOut">
               <a:rPr lang="en-US" smtClean="0"/>
               <a:pPr/>
-              <a:t>4/17/2023</a:t>
+              <a:t>4/18/2023</a:t>
             </a:fld>
             <a:endParaRPr lang="en-US"/>
           </a:p>
@@ -17055,38 +17055,19 @@
           <a:p>
             <a:r>
               <a:rPr lang="en-US" dirty="0"/>
-              <a:t>Dockerfile Build &amp; Push to registry</a:t>
+              <a:t>Dockerfile Build &amp; Push </a:t>
             </a:r>
-          </a:p>
-          <a:p>
             <a:r>
-              <a:rPr lang="en-US" dirty="0"/>
-              <a:t>Docker volume</a:t>
+              <a:rPr lang="en-US"/>
+              <a:t>to registry</a:t>
             </a:r>
+            <a:endParaRPr lang="en-US" dirty="0"/>
           </a:p>
           <a:p>
             <a:r>
               <a:rPr lang="en-US" dirty="0"/>
               <a:t>Docker Port Expose/Publish</a:t>
             </a:r>
-          </a:p>
-          <a:p>
-            <a:r>
-              <a:rPr lang="en-US" dirty="0"/>
-              <a:t>Docker Network</a:t>
-            </a:r>
-          </a:p>
-          <a:p>
-            <a:r>
-              <a:rPr lang="en-US" dirty="0"/>
-              <a:t>Docker logging and tracing/inspect</a:t>
-            </a:r>
-          </a:p>
-          <a:p>
-            <a:pPr marL="0" indent="0">
-              <a:buNone/>
-            </a:pPr>
-            <a:endParaRPr lang="en-US" dirty="0"/>
           </a:p>
           <a:p>
             <a:pPr marL="1371600" lvl="3" indent="0">

</xml_diff>